<commit_message>
Updated README.txt and Enterted youtube link
</commit_message>
<xml_diff>
--- a/Submission2/Slide.pptx
+++ b/Submission2/Slide.pptx
@@ -18924,7 +18924,7 @@
             <a:tbl>
               <a:tblPr>
                 <a:noFill/>
-                <a:tableStyleId>{3D4D40B7-CDAC-40C7-BE51-8DBFC89EE635}</a:tableStyleId>
+                <a:tableStyleId>{AF6B9275-481E-4F55-8CBE-E9FC2CE62CB8}</a:tableStyleId>
               </a:tblPr>
               <a:tblGrid>
                 <a:gridCol w="2041825"/>
@@ -22655,7 +22655,11 @@
             </a:pPr>
             <a:r>
               <a:rPr lang="en"/>
-              <a:t>Reduced overfitting</a:t>
+              <a:t>F</a:t>
+            </a:r>
+            <a:r>
+              <a:rPr lang="en"/>
+              <a:t>ast learning</a:t>
             </a:r>
             <a:endParaRPr/>
           </a:p>
@@ -25642,44 +25646,44 @@
 </file>
 
 <file path=ppt/theme/theme1.xml><?xml version="1.0" encoding="utf-8"?>
-<a:theme xmlns:a="http://schemas.openxmlformats.org/drawingml/2006/main" xmlns:r="http://schemas.openxmlformats.org/officeDocument/2006/relationships" name="Marina">
+<a:theme xmlns:a="http://schemas.openxmlformats.org/drawingml/2006/main" xmlns:r="http://schemas.openxmlformats.org/officeDocument/2006/relationships">
   <a:themeElements>
-    <a:clrScheme name="Marina">
+    <a:clrScheme name="Default">
       <a:dk1>
-        <a:srgbClr val="FFFFFF"/>
+        <a:srgbClr val="000000"/>
       </a:dk1>
       <a:lt1>
-        <a:srgbClr val="00517C"/>
+        <a:srgbClr val="FFFFFF"/>
       </a:lt1>
       <a:dk2>
-        <a:srgbClr val="004065"/>
+        <a:srgbClr val="158158"/>
       </a:dk2>
       <a:lt2>
-        <a:srgbClr val="CFD8DC"/>
+        <a:srgbClr val="F3F3F3"/>
       </a:lt2>
       <a:accent1>
-        <a:srgbClr val="0277BD"/>
+        <a:srgbClr val="058DC7"/>
       </a:accent1>
       <a:accent2>
-        <a:srgbClr val="558B2F"/>
+        <a:srgbClr val="50B432"/>
       </a:accent2>
       <a:accent3>
-        <a:srgbClr val="009688"/>
+        <a:srgbClr val="ED561B"/>
       </a:accent3>
       <a:accent4>
-        <a:srgbClr val="039BE5"/>
+        <a:srgbClr val="EDEF00"/>
       </a:accent4>
       <a:accent5>
-        <a:srgbClr val="8BC34A"/>
+        <a:srgbClr val="24CBE5"/>
       </a:accent5>
       <a:accent6>
-        <a:srgbClr val="FFEB38"/>
+        <a:srgbClr val="64E572"/>
       </a:accent6>
       <a:hlink>
-        <a:srgbClr val="8BC34A"/>
+        <a:srgbClr val="2200CC"/>
       </a:hlink>
       <a:folHlink>
-        <a:srgbClr val="8BC34A"/>
+        <a:srgbClr val="551A8B"/>
       </a:folHlink>
     </a:clrScheme>
     <a:fontScheme name="Office">
@@ -25921,44 +25925,44 @@
 </file>
 
 <file path=ppt/theme/theme2.xml><?xml version="1.0" encoding="utf-8"?>
-<a:theme xmlns:a="http://schemas.openxmlformats.org/drawingml/2006/main" xmlns:r="http://schemas.openxmlformats.org/officeDocument/2006/relationships">
+<a:theme xmlns:a="http://schemas.openxmlformats.org/drawingml/2006/main" xmlns:r="http://schemas.openxmlformats.org/officeDocument/2006/relationships" name="Marina">
   <a:themeElements>
-    <a:clrScheme name="Default">
+    <a:clrScheme name="Marina">
       <a:dk1>
-        <a:srgbClr val="000000"/>
+        <a:srgbClr val="FFFFFF"/>
       </a:dk1>
       <a:lt1>
-        <a:srgbClr val="FFFFFF"/>
+        <a:srgbClr val="00517C"/>
       </a:lt1>
       <a:dk2>
-        <a:srgbClr val="158158"/>
+        <a:srgbClr val="004065"/>
       </a:dk2>
       <a:lt2>
-        <a:srgbClr val="F3F3F3"/>
+        <a:srgbClr val="CFD8DC"/>
       </a:lt2>
       <a:accent1>
-        <a:srgbClr val="058DC7"/>
+        <a:srgbClr val="0277BD"/>
       </a:accent1>
       <a:accent2>
-        <a:srgbClr val="50B432"/>
+        <a:srgbClr val="558B2F"/>
       </a:accent2>
       <a:accent3>
-        <a:srgbClr val="ED561B"/>
+        <a:srgbClr val="009688"/>
       </a:accent3>
       <a:accent4>
-        <a:srgbClr val="EDEF00"/>
+        <a:srgbClr val="039BE5"/>
       </a:accent4>
       <a:accent5>
-        <a:srgbClr val="24CBE5"/>
+        <a:srgbClr val="8BC34A"/>
       </a:accent5>
       <a:accent6>
-        <a:srgbClr val="64E572"/>
+        <a:srgbClr val="FFEB38"/>
       </a:accent6>
       <a:hlink>
-        <a:srgbClr val="2200CC"/>
+        <a:srgbClr val="8BC34A"/>
       </a:hlink>
       <a:folHlink>
-        <a:srgbClr val="551A8B"/>
+        <a:srgbClr val="8BC34A"/>
       </a:folHlink>
     </a:clrScheme>
     <a:fontScheme name="Office">

</xml_diff>